<commit_message>
Modified the powerpoint to finish the teachercom registration
All powerpoints except the presentation should be up to date
</commit_message>
<xml_diff>
--- a/doc/how_to_sign_up_for_teachercom.pptx
+++ b/doc/how_to_sign_up_for_teachercom.pptx
@@ -19,6 +19,8 @@
     <p:sldId id="268" r:id="rId13"/>
     <p:sldId id="269" r:id="rId14"/>
     <p:sldId id="266" r:id="rId15"/>
+    <p:sldId id="270" r:id="rId16"/>
+    <p:sldId id="271" r:id="rId17"/>
   </p:sldIdLst>
   <p:sldSz cx="9144000" cy="6858000" type="screen4x3"/>
   <p:notesSz cx="6858000" cy="9144000"/>
@@ -403,6 +405,7 @@
           <a:p>
             <a:fld id="{AE8FFDD0-DE58-1441-9DAE-7712FE471BCE}" type="datetimeFigureOut">
               <a:rPr lang="en-US" smtClean="0"/>
+              <a:pPr/>
               <a:t>12/2/12</a:t>
             </a:fld>
             <a:endParaRPr lang="en-US"/>
@@ -445,6 +448,7 @@
           <a:p>
             <a:fld id="{3C92CE63-BCCB-CC4A-9BD9-E254AB8C58FB}" type="slidenum">
               <a:rPr lang="en-US" smtClean="0"/>
+              <a:pPr/>
               <a:t>‹#›</a:t>
             </a:fld>
             <a:endParaRPr lang="en-US"/>
@@ -592,6 +596,7 @@
           <a:p>
             <a:fld id="{AE8FFDD0-DE58-1441-9DAE-7712FE471BCE}" type="datetimeFigureOut">
               <a:rPr lang="en-US" smtClean="0"/>
+              <a:pPr/>
               <a:t>12/2/12</a:t>
             </a:fld>
             <a:endParaRPr lang="en-US"/>
@@ -634,6 +639,7 @@
           <a:p>
             <a:fld id="{3C92CE63-BCCB-CC4A-9BD9-E254AB8C58FB}" type="slidenum">
               <a:rPr lang="en-US" smtClean="0"/>
+              <a:pPr/>
               <a:t>‹#›</a:t>
             </a:fld>
             <a:endParaRPr lang="en-US"/>
@@ -857,6 +863,7 @@
           <a:p>
             <a:fld id="{AE8FFDD0-DE58-1441-9DAE-7712FE471BCE}" type="datetimeFigureOut">
               <a:rPr lang="en-US" smtClean="0"/>
+              <a:pPr/>
               <a:t>12/2/12</a:t>
             </a:fld>
             <a:endParaRPr lang="en-US"/>
@@ -899,6 +906,7 @@
           <a:p>
             <a:fld id="{3C92CE63-BCCB-CC4A-9BD9-E254AB8C58FB}" type="slidenum">
               <a:rPr lang="en-US" smtClean="0"/>
+              <a:pPr/>
               <a:t>‹#›</a:t>
             </a:fld>
             <a:endParaRPr lang="en-US"/>
@@ -1032,6 +1040,7 @@
           <a:p>
             <a:fld id="{AE8FFDD0-DE58-1441-9DAE-7712FE471BCE}" type="datetimeFigureOut">
               <a:rPr lang="en-US" smtClean="0"/>
+              <a:pPr/>
               <a:t>12/2/12</a:t>
             </a:fld>
             <a:endParaRPr lang="en-US"/>
@@ -1074,6 +1083,7 @@
           <a:p>
             <a:fld id="{3C92CE63-BCCB-CC4A-9BD9-E254AB8C58FB}" type="slidenum">
               <a:rPr lang="en-US" smtClean="0"/>
+              <a:pPr/>
               <a:t>‹#›</a:t>
             </a:fld>
             <a:endParaRPr lang="en-US"/>
@@ -1197,6 +1207,7 @@
           <a:p>
             <a:fld id="{AE8FFDD0-DE58-1441-9DAE-7712FE471BCE}" type="datetimeFigureOut">
               <a:rPr lang="en-US" smtClean="0"/>
+              <a:pPr/>
               <a:t>12/2/12</a:t>
             </a:fld>
             <a:endParaRPr lang="en-US"/>
@@ -1239,6 +1250,7 @@
           <a:p>
             <a:fld id="{3C92CE63-BCCB-CC4A-9BD9-E254AB8C58FB}" type="slidenum">
               <a:rPr lang="en-US" smtClean="0"/>
+              <a:pPr/>
               <a:t>‹#›</a:t>
             </a:fld>
             <a:endParaRPr lang="en-US"/>
@@ -1439,6 +1451,7 @@
           <a:p>
             <a:fld id="{AE8FFDD0-DE58-1441-9DAE-7712FE471BCE}" type="datetimeFigureOut">
               <a:rPr lang="en-US" smtClean="0"/>
+              <a:pPr/>
               <a:t>12/2/12</a:t>
             </a:fld>
             <a:endParaRPr lang="en-US"/>
@@ -1481,6 +1494,7 @@
           <a:p>
             <a:fld id="{3C92CE63-BCCB-CC4A-9BD9-E254AB8C58FB}" type="slidenum">
               <a:rPr lang="en-US" smtClean="0"/>
+              <a:pPr/>
               <a:t>‹#›</a:t>
             </a:fld>
             <a:endParaRPr lang="en-US"/>
@@ -1762,6 +1776,7 @@
           <a:p>
             <a:fld id="{AE8FFDD0-DE58-1441-9DAE-7712FE471BCE}" type="datetimeFigureOut">
               <a:rPr lang="en-US" smtClean="0"/>
+              <a:pPr/>
               <a:t>12/2/12</a:t>
             </a:fld>
             <a:endParaRPr lang="en-US"/>
@@ -1804,6 +1819,7 @@
           <a:p>
             <a:fld id="{3C92CE63-BCCB-CC4A-9BD9-E254AB8C58FB}" type="slidenum">
               <a:rPr lang="en-US" smtClean="0"/>
+              <a:pPr/>
               <a:t>‹#›</a:t>
             </a:fld>
             <a:endParaRPr lang="en-US"/>
@@ -2060,6 +2076,7 @@
           <a:p>
             <a:fld id="{AE8FFDD0-DE58-1441-9DAE-7712FE471BCE}" type="datetimeFigureOut">
               <a:rPr lang="en-US" smtClean="0"/>
+              <a:pPr/>
               <a:t>12/2/12</a:t>
             </a:fld>
             <a:endParaRPr lang="en-US"/>
@@ -2102,6 +2119,7 @@
           <a:p>
             <a:fld id="{3C92CE63-BCCB-CC4A-9BD9-E254AB8C58FB}" type="slidenum">
               <a:rPr lang="en-US" smtClean="0"/>
+              <a:pPr/>
               <a:t>‹#›</a:t>
             </a:fld>
             <a:endParaRPr lang="en-US"/>
@@ -2516,6 +2534,7 @@
           <a:p>
             <a:fld id="{AE8FFDD0-DE58-1441-9DAE-7712FE471BCE}" type="datetimeFigureOut">
               <a:rPr lang="en-US" smtClean="0"/>
+              <a:pPr/>
               <a:t>12/2/12</a:t>
             </a:fld>
             <a:endParaRPr lang="en-US"/>
@@ -2558,6 +2577,7 @@
           <a:p>
             <a:fld id="{3C92CE63-BCCB-CC4A-9BD9-E254AB8C58FB}" type="slidenum">
               <a:rPr lang="en-US" smtClean="0"/>
+              <a:pPr/>
               <a:t>‹#›</a:t>
             </a:fld>
             <a:endParaRPr lang="en-US"/>
@@ -2629,6 +2649,7 @@
           <a:p>
             <a:fld id="{AE8FFDD0-DE58-1441-9DAE-7712FE471BCE}" type="datetimeFigureOut">
               <a:rPr lang="en-US" smtClean="0"/>
+              <a:pPr/>
               <a:t>12/2/12</a:t>
             </a:fld>
             <a:endParaRPr lang="en-US"/>
@@ -2671,6 +2692,7 @@
           <a:p>
             <a:fld id="{3C92CE63-BCCB-CC4A-9BD9-E254AB8C58FB}" type="slidenum">
               <a:rPr lang="en-US" smtClean="0"/>
+              <a:pPr/>
               <a:t>‹#›</a:t>
             </a:fld>
             <a:endParaRPr lang="en-US"/>
@@ -2719,6 +2741,7 @@
           <a:p>
             <a:fld id="{AE8FFDD0-DE58-1441-9DAE-7712FE471BCE}" type="datetimeFigureOut">
               <a:rPr lang="en-US" smtClean="0"/>
+              <a:pPr/>
               <a:t>12/2/12</a:t>
             </a:fld>
             <a:endParaRPr lang="en-US"/>
@@ -2761,6 +2784,7 @@
           <a:p>
             <a:fld id="{3C92CE63-BCCB-CC4A-9BD9-E254AB8C58FB}" type="slidenum">
               <a:rPr lang="en-US" smtClean="0"/>
+              <a:pPr/>
               <a:t>‹#›</a:t>
             </a:fld>
             <a:endParaRPr lang="en-US"/>
@@ -2998,6 +3022,7 @@
           <a:p>
             <a:fld id="{AE8FFDD0-DE58-1441-9DAE-7712FE471BCE}" type="datetimeFigureOut">
               <a:rPr lang="en-US" smtClean="0"/>
+              <a:pPr/>
               <a:t>12/2/12</a:t>
             </a:fld>
             <a:endParaRPr lang="en-US"/>
@@ -3040,6 +3065,7 @@
           <a:p>
             <a:fld id="{3C92CE63-BCCB-CC4A-9BD9-E254AB8C58FB}" type="slidenum">
               <a:rPr lang="en-US" smtClean="0"/>
+              <a:pPr/>
               <a:t>‹#›</a:t>
             </a:fld>
             <a:endParaRPr lang="en-US"/>
@@ -3204,6 +3230,7 @@
           <a:p>
             <a:fld id="{AE8FFDD0-DE58-1441-9DAE-7712FE471BCE}" type="datetimeFigureOut">
               <a:rPr lang="en-US" smtClean="0"/>
+              <a:pPr/>
               <a:t>12/2/12</a:t>
             </a:fld>
             <a:endParaRPr lang="en-US"/>
@@ -3278,6 +3305,7 @@
           <a:p>
             <a:fld id="{3C92CE63-BCCB-CC4A-9BD9-E254AB8C58FB}" type="slidenum">
               <a:rPr lang="en-US" smtClean="0"/>
+              <a:pPr/>
               <a:t>‹#›</a:t>
             </a:fld>
             <a:endParaRPr lang="en-US"/>
@@ -3932,6 +3960,104 @@
           </a:p>
         </p:txBody>
       </p:sp>
+    </p:spTree>
+  </p:cSld>
+  <p:clrMapOvr>
+    <a:masterClrMapping/>
+  </p:clrMapOvr>
+</p:sld>
+</file>
+
+<file path=ppt/slides/slide15.xml><?xml version="1.0" encoding="utf-8"?>
+<p:sld xmlns:a="http://schemas.openxmlformats.org/drawingml/2006/main" xmlns:r="http://schemas.openxmlformats.org/officeDocument/2006/relationships" xmlns:mc="http://schemas.openxmlformats.org/markup-compatibility/2006" xmlns:mv="urn:schemas-microsoft-com:mac:vml" xmlns:p="http://schemas.openxmlformats.org/presentationml/2006/main" mc:Ignorable="mv" mc:PreserveAttributes="mv:*">
+  <p:cSld>
+    <p:spTree>
+      <p:nvGrpSpPr>
+        <p:cNvPr id="1" name=""/>
+        <p:cNvGrpSpPr/>
+        <p:nvPr/>
+      </p:nvGrpSpPr>
+      <p:grpSpPr>
+        <a:xfrm>
+          <a:off x="0" y="0"/>
+          <a:ext cx="0" cy="0"/>
+          <a:chOff x="0" y="0"/>
+          <a:chExt cx="0" cy="0"/>
+        </a:xfrm>
+      </p:grpSpPr>
+      <p:pic>
+        <p:nvPicPr>
+          <p:cNvPr id="4" name="Picture 3" descr="Step 10.png"/>
+          <p:cNvPicPr>
+            <a:picLocks noChangeAspect="1"/>
+          </p:cNvPicPr>
+          <p:nvPr/>
+        </p:nvPicPr>
+        <p:blipFill>
+          <a:blip r:embed="rId2"/>
+          <a:stretch>
+            <a:fillRect/>
+          </a:stretch>
+        </p:blipFill>
+        <p:spPr>
+          <a:xfrm>
+            <a:off x="0" y="460496"/>
+            <a:ext cx="9144000" cy="3786188"/>
+          </a:xfrm>
+          <a:prstGeom prst="rect">
+            <a:avLst/>
+          </a:prstGeom>
+        </p:spPr>
+      </p:pic>
+    </p:spTree>
+  </p:cSld>
+  <p:clrMapOvr>
+    <a:masterClrMapping/>
+  </p:clrMapOvr>
+</p:sld>
+</file>
+
+<file path=ppt/slides/slide16.xml><?xml version="1.0" encoding="utf-8"?>
+<p:sld xmlns:a="http://schemas.openxmlformats.org/drawingml/2006/main" xmlns:r="http://schemas.openxmlformats.org/officeDocument/2006/relationships" xmlns:mc="http://schemas.openxmlformats.org/markup-compatibility/2006" xmlns:mv="urn:schemas-microsoft-com:mac:vml" xmlns:p="http://schemas.openxmlformats.org/presentationml/2006/main" mc:Ignorable="mv" mc:PreserveAttributes="mv:*">
+  <p:cSld>
+    <p:spTree>
+      <p:nvGrpSpPr>
+        <p:cNvPr id="1" name=""/>
+        <p:cNvGrpSpPr/>
+        <p:nvPr/>
+      </p:nvGrpSpPr>
+      <p:grpSpPr>
+        <a:xfrm>
+          <a:off x="0" y="0"/>
+          <a:ext cx="0" cy="0"/>
+          <a:chOff x="0" y="0"/>
+          <a:chExt cx="0" cy="0"/>
+        </a:xfrm>
+      </p:grpSpPr>
+      <p:pic>
+        <p:nvPicPr>
+          <p:cNvPr id="2" name="Picture 1" descr="Step 11.png"/>
+          <p:cNvPicPr>
+            <a:picLocks noChangeAspect="1"/>
+          </p:cNvPicPr>
+          <p:nvPr/>
+        </p:nvPicPr>
+        <p:blipFill>
+          <a:blip r:embed="rId2"/>
+          <a:stretch>
+            <a:fillRect/>
+          </a:stretch>
+        </p:blipFill>
+        <p:spPr>
+          <a:xfrm>
+            <a:off x="0" y="871885"/>
+            <a:ext cx="9144000" cy="2553730"/>
+          </a:xfrm>
+          <a:prstGeom prst="rect">
+            <a:avLst/>
+          </a:prstGeom>
+        </p:spPr>
+      </p:pic>
     </p:spTree>
   </p:cSld>
   <p:clrMapOvr>

</xml_diff>

<commit_message>
Added the latest changes to the powerpoints
</commit_message>
<xml_diff>
--- a/doc/how_to_sign_up_for_teachercom.pptx
+++ b/doc/how_to_sign_up_for_teachercom.pptx
@@ -3769,7 +3769,7 @@
       </p:grpSpPr>
       <p:pic>
         <p:nvPicPr>
-          <p:cNvPr id="2" name="Picture 1" descr="Step 7.png"/>
+          <p:cNvPr id="4" name="Picture 3" descr="Step 7.png"/>
           <p:cNvPicPr>
             <a:picLocks noChangeAspect="1"/>
           </p:cNvPicPr>
@@ -3783,8 +3783,8 @@
         </p:blipFill>
         <p:spPr>
           <a:xfrm>
-            <a:off x="914875" y="0"/>
-            <a:ext cx="7314249" cy="6858000"/>
+            <a:off x="0" y="176822"/>
+            <a:ext cx="9144000" cy="5415785"/>
           </a:xfrm>
           <a:prstGeom prst="rect">
             <a:avLst/>

</xml_diff>